<commit_message>
revise power point with new image resolution
</commit_message>
<xml_diff>
--- a/DataWorkingGroup_preliminarydata.pptx
+++ b/DataWorkingGroup_preliminarydata.pptx
@@ -10,8 +10,9 @@
     <p:sldId id="258" r:id="rId4"/>
     <p:sldId id="262" r:id="rId5"/>
     <p:sldId id="259" r:id="rId6"/>
-    <p:sldId id="261" r:id="rId7"/>
-    <p:sldId id="260" r:id="rId8"/>
+    <p:sldId id="263" r:id="rId7"/>
+    <p:sldId id="261" r:id="rId8"/>
+    <p:sldId id="260" r:id="rId9"/>
   </p:sldIdLst>
   <p:sldSz cx="12192000" cy="6858000"/>
   <p:notesSz cx="6858000" cy="9144000"/>
@@ -110,6 +111,11 @@
       </a:defRPr>
     </a:lvl9pPr>
   </p:defaultTextStyle>
+  <p:extLst>
+    <p:ext uri="{EFAFB233-063F-42B5-8137-9DF3F51BA10A}">
+      <p15:sldGuideLst xmlns:p15="http://schemas.microsoft.com/office/powerpoint/2012/main"/>
+    </p:ext>
+  </p:extLst>
 </p:presentation>
 </file>
 
@@ -244,7 +250,7 @@
           <a:p>
             <a:fld id="{0F9B019F-3846-C148-B92D-85FA73C16DC7}" type="datetimeFigureOut">
               <a:rPr lang="en-US" smtClean="0"/>
-              <a:t>4/6/18</a:t>
+              <a:t>4/17/18</a:t>
             </a:fld>
             <a:endParaRPr lang="en-US"/>
           </a:p>
@@ -414,7 +420,7 @@
           <a:p>
             <a:fld id="{0F9B019F-3846-C148-B92D-85FA73C16DC7}" type="datetimeFigureOut">
               <a:rPr lang="en-US" smtClean="0"/>
-              <a:t>4/6/18</a:t>
+              <a:t>4/17/18</a:t>
             </a:fld>
             <a:endParaRPr lang="en-US"/>
           </a:p>
@@ -594,7 +600,7 @@
           <a:p>
             <a:fld id="{0F9B019F-3846-C148-B92D-85FA73C16DC7}" type="datetimeFigureOut">
               <a:rPr lang="en-US" smtClean="0"/>
-              <a:t>4/6/18</a:t>
+              <a:t>4/17/18</a:t>
             </a:fld>
             <a:endParaRPr lang="en-US"/>
           </a:p>
@@ -764,7 +770,7 @@
           <a:p>
             <a:fld id="{0F9B019F-3846-C148-B92D-85FA73C16DC7}" type="datetimeFigureOut">
               <a:rPr lang="en-US" smtClean="0"/>
-              <a:t>4/6/18</a:t>
+              <a:t>4/17/18</a:t>
             </a:fld>
             <a:endParaRPr lang="en-US"/>
           </a:p>
@@ -1010,7 +1016,7 @@
           <a:p>
             <a:fld id="{0F9B019F-3846-C148-B92D-85FA73C16DC7}" type="datetimeFigureOut">
               <a:rPr lang="en-US" smtClean="0"/>
-              <a:t>4/6/18</a:t>
+              <a:t>4/17/18</a:t>
             </a:fld>
             <a:endParaRPr lang="en-US"/>
           </a:p>
@@ -1242,7 +1248,7 @@
           <a:p>
             <a:fld id="{0F9B019F-3846-C148-B92D-85FA73C16DC7}" type="datetimeFigureOut">
               <a:rPr lang="en-US" smtClean="0"/>
-              <a:t>4/6/18</a:t>
+              <a:t>4/17/18</a:t>
             </a:fld>
             <a:endParaRPr lang="en-US"/>
           </a:p>
@@ -1609,7 +1615,7 @@
           <a:p>
             <a:fld id="{0F9B019F-3846-C148-B92D-85FA73C16DC7}" type="datetimeFigureOut">
               <a:rPr lang="en-US" smtClean="0"/>
-              <a:t>4/6/18</a:t>
+              <a:t>4/17/18</a:t>
             </a:fld>
             <a:endParaRPr lang="en-US"/>
           </a:p>
@@ -1727,7 +1733,7 @@
           <a:p>
             <a:fld id="{0F9B019F-3846-C148-B92D-85FA73C16DC7}" type="datetimeFigureOut">
               <a:rPr lang="en-US" smtClean="0"/>
-              <a:t>4/6/18</a:t>
+              <a:t>4/17/18</a:t>
             </a:fld>
             <a:endParaRPr lang="en-US"/>
           </a:p>
@@ -1822,7 +1828,7 @@
           <a:p>
             <a:fld id="{0F9B019F-3846-C148-B92D-85FA73C16DC7}" type="datetimeFigureOut">
               <a:rPr lang="en-US" smtClean="0"/>
-              <a:t>4/6/18</a:t>
+              <a:t>4/17/18</a:t>
             </a:fld>
             <a:endParaRPr lang="en-US"/>
           </a:p>
@@ -2099,7 +2105,7 @@
           <a:p>
             <a:fld id="{0F9B019F-3846-C148-B92D-85FA73C16DC7}" type="datetimeFigureOut">
               <a:rPr lang="en-US" smtClean="0"/>
-              <a:t>4/6/18</a:t>
+              <a:t>4/17/18</a:t>
             </a:fld>
             <a:endParaRPr lang="en-US"/>
           </a:p>
@@ -2352,7 +2358,7 @@
           <a:p>
             <a:fld id="{0F9B019F-3846-C148-B92D-85FA73C16DC7}" type="datetimeFigureOut">
               <a:rPr lang="en-US" smtClean="0"/>
-              <a:t>4/6/18</a:t>
+              <a:t>4/17/18</a:t>
             </a:fld>
             <a:endParaRPr lang="en-US"/>
           </a:p>
@@ -2565,7 +2571,7 @@
           <a:p>
             <a:fld id="{0F9B019F-3846-C148-B92D-85FA73C16DC7}" type="datetimeFigureOut">
               <a:rPr lang="en-US" smtClean="0"/>
-              <a:t>4/6/18</a:t>
+              <a:t>4/17/18</a:t>
             </a:fld>
             <a:endParaRPr lang="en-US"/>
           </a:p>
@@ -3062,7 +3068,7 @@
       </p:grpSpPr>
       <p:pic>
         <p:nvPicPr>
-          <p:cNvPr id="4" name="Content Placeholder 3"/>
+          <p:cNvPr id="5" name="Content Placeholder 4"/>
           <p:cNvPicPr>
             <a:picLocks noGrp="1" noChangeAspect="1"/>
           </p:cNvPicPr>
@@ -3084,8 +3090,8 @@
         </p:blipFill>
         <p:spPr>
           <a:xfrm>
-            <a:off x="-1" y="33338"/>
-            <a:ext cx="10145475" cy="6824662"/>
+            <a:off x="0" y="0"/>
+            <a:ext cx="8625814" cy="6858000"/>
           </a:xfrm>
         </p:spPr>
       </p:pic>
@@ -3101,7 +3107,7 @@
         </p:nvSpPr>
         <p:spPr>
           <a:xfrm>
-            <a:off x="5410200" y="365125"/>
+            <a:off x="7772400" y="0"/>
             <a:ext cx="4419600" cy="1325563"/>
           </a:xfrm>
         </p:spPr>
@@ -3112,10 +3118,10 @@
           <a:lstStyle/>
           <a:p>
             <a:r>
-              <a:rPr lang="en-US" sz="4000" smtClean="0"/>
+              <a:rPr lang="en-US" sz="4000" dirty="0" smtClean="0"/>
               <a:t>Note the spike at 3000 days ago ~ Dec 1 2009</a:t>
             </a:r>
-            <a:endParaRPr lang="en-US" sz="4000"/>
+            <a:endParaRPr lang="en-US" sz="4000" dirty="0"/>
           </a:p>
         </p:txBody>
       </p:sp>
@@ -3151,7 +3157,7 @@
       </p:grpSpPr>
       <p:pic>
         <p:nvPicPr>
-          <p:cNvPr id="4" name="Content Placeholder 3"/>
+          <p:cNvPr id="5" name="Content Placeholder 4"/>
           <p:cNvPicPr>
             <a:picLocks noGrp="1" noChangeAspect="1"/>
           </p:cNvPicPr>
@@ -3173,8 +3179,8 @@
         </p:blipFill>
         <p:spPr>
           <a:xfrm>
-            <a:off x="0" y="0"/>
-            <a:ext cx="10195034" cy="6858000"/>
+            <a:off x="-1" y="0"/>
+            <a:ext cx="8453298" cy="6720840"/>
           </a:xfrm>
         </p:spPr>
       </p:pic>
@@ -3298,25 +3304,81 @@
           <a:bodyPr/>
           <a:lstStyle/>
           <a:p>
-            <a:r>
-              <a:rPr lang="en-US" dirty="0"/>
-              <a:t>x</a:t>
-            </a:r>
+            <a:endParaRPr lang="en-US" dirty="0" smtClean="0"/>
+          </a:p>
+          <a:p>
+            <a:endParaRPr lang="en-US" dirty="0"/>
+          </a:p>
+          <a:p>
             <a:r>
               <a:rPr lang="en-US" dirty="0" smtClean="0"/>
-              <a:t> = Beta[1]*</a:t>
+              <a:t>x </a:t>
+            </a:r>
+            <a:r>
+              <a:rPr lang="en-US" dirty="0" smtClean="0"/>
+              <a:t>= </a:t>
+            </a:r>
+            <a:endParaRPr lang="en-US" dirty="0" smtClean="0"/>
+          </a:p>
+          <a:p>
+            <a:pPr lvl="1"/>
+            <a:r>
+              <a:rPr lang="en-US" dirty="0" smtClean="0"/>
+              <a:t>Beta[1</a:t>
+            </a:r>
+            <a:r>
+              <a:rPr lang="en-US" dirty="0" smtClean="0"/>
+              <a:t>]*</a:t>
             </a:r>
             <a:r>
               <a:rPr lang="en-US" dirty="0" err="1" smtClean="0"/>
-              <a:t>days_since_last_checkout+Beta</a:t>
+              <a:t>days_since_last_checkout</a:t>
             </a:r>
             <a:r>
               <a:rPr lang="en-US" dirty="0" smtClean="0"/>
-              <a:t>[2]*</a:t>
+              <a:t> + </a:t>
+            </a:r>
+          </a:p>
+          <a:p>
+            <a:pPr lvl="1"/>
+            <a:r>
+              <a:rPr lang="en-US" dirty="0" smtClean="0"/>
+              <a:t>Beta[2</a:t>
+            </a:r>
+            <a:r>
+              <a:rPr lang="en-US" dirty="0" smtClean="0"/>
+              <a:t>]*</a:t>
             </a:r>
             <a:r>
               <a:rPr lang="en-US" dirty="0" err="1" smtClean="0"/>
               <a:t>total_checkouts</a:t>
+            </a:r>
+            <a:r>
+              <a:rPr lang="en-US" dirty="0" smtClean="0"/>
+              <a:t> +</a:t>
+            </a:r>
+          </a:p>
+          <a:p>
+            <a:pPr lvl="1"/>
+            <a:r>
+              <a:rPr lang="mr-IN" dirty="0" smtClean="0"/>
+              <a:t>…</a:t>
+            </a:r>
+            <a:endParaRPr lang="en-US" dirty="0" smtClean="0"/>
+          </a:p>
+          <a:p>
+            <a:pPr lvl="1"/>
+            <a:r>
+              <a:rPr lang="en-US" dirty="0" smtClean="0"/>
+              <a:t>Beta[</a:t>
+            </a:r>
+            <a:r>
+              <a:rPr lang="en-US" dirty="0"/>
+              <a:t>n</a:t>
+            </a:r>
+            <a:r>
+              <a:rPr lang="en-US" dirty="0" smtClean="0"/>
+              <a:t>]*additional features</a:t>
             </a:r>
             <a:endParaRPr lang="en-US" dirty="0" smtClean="0"/>
           </a:p>
@@ -3353,7 +3415,7 @@
         </p:blipFill>
         <p:spPr>
           <a:xfrm>
-            <a:off x="1429613" y="3638550"/>
+            <a:off x="1292657" y="2015596"/>
             <a:ext cx="3561487" cy="725488"/>
           </a:xfrm>
           <a:prstGeom prst="rect">
@@ -3377,7 +3439,7 @@
         </p:blipFill>
         <p:spPr>
           <a:xfrm>
-            <a:off x="5308600" y="2741084"/>
+            <a:off x="6096000" y="2177204"/>
             <a:ext cx="5080000" cy="3386667"/>
           </a:xfrm>
           <a:prstGeom prst="rect">
@@ -3483,9 +3545,39 @@
           <a:chExt cx="0" cy="0"/>
         </a:xfrm>
       </p:grpSpPr>
+      <p:sp>
+        <p:nvSpPr>
+          <p:cNvPr id="2" name="Title 1"/>
+          <p:cNvSpPr>
+            <a:spLocks noGrp="1"/>
+          </p:cNvSpPr>
+          <p:nvPr>
+            <p:ph type="title"/>
+          </p:nvPr>
+        </p:nvSpPr>
+        <p:spPr>
+          <a:xfrm>
+            <a:off x="8834120" y="1375077"/>
+            <a:ext cx="7061200" cy="2047875"/>
+          </a:xfrm>
+        </p:spPr>
+        <p:txBody>
+          <a:bodyPr>
+            <a:normAutofit/>
+          </a:bodyPr>
+          <a:lstStyle/>
+          <a:p>
+            <a:r>
+              <a:rPr lang="en-US" sz="5400" smtClean="0"/>
+              <a:t>Beta=(-1,1)</a:t>
+            </a:r>
+            <a:endParaRPr lang="en-US" sz="5400" dirty="0"/>
+          </a:p>
+        </p:txBody>
+      </p:sp>
       <p:pic>
         <p:nvPicPr>
-          <p:cNvPr id="4" name="Content Placeholder 3"/>
+          <p:cNvPr id="7" name="Content Placeholder 6"/>
           <p:cNvPicPr>
             <a:picLocks noGrp="1" noChangeAspect="1"/>
           </p:cNvPicPr>
@@ -3507,41 +3599,11 @@
         </p:blipFill>
         <p:spPr>
           <a:xfrm>
-            <a:off x="-1" y="33338"/>
-            <a:ext cx="10145475" cy="6824662"/>
+            <a:off x="0" y="0"/>
+            <a:ext cx="8610600" cy="6845904"/>
           </a:xfrm>
         </p:spPr>
       </p:pic>
-      <p:sp>
-        <p:nvSpPr>
-          <p:cNvPr id="2" name="Title 1"/>
-          <p:cNvSpPr>
-            <a:spLocks noGrp="1"/>
-          </p:cNvSpPr>
-          <p:nvPr>
-            <p:ph type="title"/>
-          </p:nvPr>
-        </p:nvSpPr>
-        <p:spPr>
-          <a:xfrm>
-            <a:off x="6426200" y="998538"/>
-            <a:ext cx="7061200" cy="2047875"/>
-          </a:xfrm>
-        </p:spPr>
-        <p:txBody>
-          <a:bodyPr>
-            <a:normAutofit/>
-          </a:bodyPr>
-          <a:lstStyle/>
-          <a:p>
-            <a:r>
-              <a:rPr lang="en-US" sz="5400" smtClean="0"/>
-              <a:t>Beta=(-1,1)</a:t>
-            </a:r>
-            <a:endParaRPr lang="en-US" sz="5400" dirty="0"/>
-          </a:p>
-        </p:txBody>
-      </p:sp>
     </p:spTree>
     <p:extLst>
       <p:ext uri="{BB962C8B-B14F-4D97-AF65-F5344CB8AC3E}">
@@ -3594,22 +3656,48 @@
           <a:bodyPr/>
           <a:lstStyle/>
           <a:p>
-            <a:endParaRPr lang="en-US"/>
+            <a:r>
+              <a:rPr lang="en-US" dirty="0" smtClean="0"/>
+              <a:t>Model Cutoff</a:t>
+            </a:r>
+            <a:endParaRPr lang="en-US" dirty="0"/>
           </a:p>
         </p:txBody>
       </p:sp>
       <p:pic>
         <p:nvPicPr>
-          <p:cNvPr id="4" name="Content Placeholder 3"/>
+          <p:cNvPr id="7" name="Picture 6"/>
           <p:cNvPicPr>
-            <a:picLocks noGrp="1" noChangeAspect="1"/>
+            <a:picLocks noChangeAspect="1"/>
           </p:cNvPicPr>
-          <p:nvPr>
-            <p:ph idx="1"/>
-          </p:nvPr>
+          <p:nvPr/>
         </p:nvPicPr>
         <p:blipFill>
-          <a:blip r:embed="rId2">
+          <a:blip r:embed="rId2"/>
+          <a:stretch>
+            <a:fillRect/>
+          </a:stretch>
+        </p:blipFill>
+        <p:spPr>
+          <a:xfrm>
+            <a:off x="838200" y="2240491"/>
+            <a:ext cx="5080000" cy="3386667"/>
+          </a:xfrm>
+          <a:prstGeom prst="rect">
+            <a:avLst/>
+          </a:prstGeom>
+        </p:spPr>
+      </p:pic>
+      <p:pic>
+        <p:nvPicPr>
+          <p:cNvPr id="9" name="Content Placeholder 9"/>
+          <p:cNvPicPr>
+            <a:picLocks noChangeAspect="1"/>
+          </p:cNvPicPr>
+          <p:nvPr/>
+        </p:nvPicPr>
+        <p:blipFill>
+          <a:blip r:embed="rId3">
             <a:extLst>
               <a:ext uri="{28A0092B-C50C-407E-A947-70E740481C1C}">
                 <a14:useLocalDpi xmlns:a14="http://schemas.microsoft.com/office/drawing/2010/main" val="0"/>
@@ -3622,70 +3710,593 @@
         </p:blipFill>
         <p:spPr>
           <a:xfrm>
-            <a:off x="0" y="0"/>
-            <a:ext cx="10195034" cy="6858000"/>
-          </a:xfrm>
-        </p:spPr>
-      </p:pic>
-      <p:sp>
-        <p:nvSpPr>
-          <p:cNvPr id="5" name="Title 1"/>
-          <p:cNvSpPr txBox="1">
-            <a:spLocks/>
-          </p:cNvSpPr>
-          <p:nvPr/>
-        </p:nvSpPr>
-        <p:spPr>
-          <a:xfrm>
-            <a:off x="6426200" y="998538"/>
-            <a:ext cx="7061200" cy="2047875"/>
+            <a:off x="6096000" y="1345328"/>
+            <a:ext cx="5572734" cy="4430632"/>
           </a:xfrm>
           <a:prstGeom prst="rect">
             <a:avLst/>
           </a:prstGeom>
         </p:spPr>
-        <p:txBody>
-          <a:bodyPr vert="horz" lIns="91440" tIns="45720" rIns="91440" bIns="45720" rtlCol="0" anchor="ctr">
+      </p:pic>
+      <p:cxnSp>
+        <p:nvCxnSpPr>
+          <p:cNvPr id="11" name="Straight Connector 10"/>
+          <p:cNvCxnSpPr/>
+          <p:nvPr/>
+        </p:nvCxnSpPr>
+        <p:spPr>
+          <a:xfrm>
+            <a:off x="10088880" y="1844040"/>
+            <a:ext cx="0" cy="4385310"/>
+          </a:xfrm>
+          <a:prstGeom prst="line">
+            <a:avLst/>
+          </a:prstGeom>
+          <a:ln w="50800">
+            <a:solidFill>
+              <a:srgbClr val="C00000"/>
+            </a:solidFill>
+          </a:ln>
+        </p:spPr>
+        <p:style>
+          <a:lnRef idx="1">
+            <a:schemeClr val="accent1"/>
+          </a:lnRef>
+          <a:fillRef idx="0">
+            <a:schemeClr val="accent1"/>
+          </a:fillRef>
+          <a:effectRef idx="0">
+            <a:schemeClr val="accent1"/>
+          </a:effectRef>
+          <a:fontRef idx="minor">
+            <a:schemeClr val="tx1"/>
+          </a:fontRef>
+        </p:style>
+      </p:cxnSp>
+      <p:cxnSp>
+        <p:nvCxnSpPr>
+          <p:cNvPr id="13" name="Straight Arrow Connector 12"/>
+          <p:cNvCxnSpPr/>
+          <p:nvPr/>
+        </p:nvCxnSpPr>
+        <p:spPr>
+          <a:xfrm>
+            <a:off x="10088880" y="2240491"/>
+            <a:ext cx="1074420" cy="0"/>
+          </a:xfrm>
+          <a:prstGeom prst="straightConnector1">
+            <a:avLst/>
+          </a:prstGeom>
+          <a:ln w="50800">
+            <a:solidFill>
+              <a:srgbClr val="0070C0"/>
+            </a:solidFill>
+            <a:tailEnd type="triangle"/>
+          </a:ln>
+        </p:spPr>
+        <p:style>
+          <a:lnRef idx="1">
+            <a:schemeClr val="accent1"/>
+          </a:lnRef>
+          <a:fillRef idx="0">
+            <a:schemeClr val="accent1"/>
+          </a:fillRef>
+          <a:effectRef idx="0">
+            <a:schemeClr val="accent1"/>
+          </a:effectRef>
+          <a:fontRef idx="minor">
+            <a:schemeClr val="tx1"/>
+          </a:fontRef>
+        </p:style>
+      </p:cxnSp>
+      <p:sp>
+        <p:nvSpPr>
+          <p:cNvPr id="5" name="Content Placeholder 4"/>
+          <p:cNvSpPr>
+            <a:spLocks noGrp="1"/>
+          </p:cNvSpPr>
+          <p:nvPr>
+            <p:ph idx="1"/>
+          </p:nvPr>
+        </p:nvSpPr>
+        <p:spPr>
+          <a:xfrm>
+            <a:off x="10177780" y="2379014"/>
+            <a:ext cx="1402054" cy="583753"/>
+          </a:xfrm>
+        </p:spPr>
+        <p:txBody>
+          <a:bodyPr>
+            <a:normAutofit/>
+          </a:bodyPr>
+          <a:lstStyle/>
+          <a:p>
+            <a:pPr marL="0" marR="0" lvl="0" indent="0" defTabSz="914400" eaLnBrk="1" fontAlgn="auto" latinLnBrk="0" hangingPunct="1">
+              <a:lnSpc>
+                <a:spcPct val="100000"/>
+              </a:lnSpc>
+              <a:spcBef>
+                <a:spcPts val="0"/>
+              </a:spcBef>
+              <a:spcAft>
+                <a:spcPts val="0"/>
+              </a:spcAft>
+              <a:buClrTx/>
+              <a:buSzTx/>
+              <a:buFontTx/>
+              <a:buNone/>
+              <a:tabLst/>
+              <a:defRPr/>
+            </a:pPr>
+            <a:r>
+              <a:rPr lang="en-US" smtClean="0"/>
+              <a:t>Action 1</a:t>
+            </a:r>
+            <a:endParaRPr lang="en-US" dirty="0"/>
+          </a:p>
+        </p:txBody>
+      </p:sp>
+      <p:cxnSp>
+        <p:nvCxnSpPr>
+          <p:cNvPr id="15" name="Straight Arrow Connector 14"/>
+          <p:cNvCxnSpPr/>
+          <p:nvPr/>
+        </p:nvCxnSpPr>
+        <p:spPr>
+          <a:xfrm flipH="1" flipV="1">
+            <a:off x="7106973" y="3840691"/>
+            <a:ext cx="2981907" cy="11829"/>
+          </a:xfrm>
+          <a:prstGeom prst="straightConnector1">
+            <a:avLst/>
+          </a:prstGeom>
+          <a:ln w="50800">
+            <a:solidFill>
+              <a:srgbClr val="0070C0"/>
+            </a:solidFill>
+            <a:tailEnd type="triangle"/>
+          </a:ln>
+        </p:spPr>
+        <p:style>
+          <a:lnRef idx="1">
+            <a:schemeClr val="accent1"/>
+          </a:lnRef>
+          <a:fillRef idx="0">
+            <a:schemeClr val="accent1"/>
+          </a:fillRef>
+          <a:effectRef idx="0">
+            <a:schemeClr val="accent1"/>
+          </a:effectRef>
+          <a:fontRef idx="minor">
+            <a:schemeClr val="tx1"/>
+          </a:fontRef>
+        </p:style>
+      </p:cxnSp>
+      <p:sp>
+        <p:nvSpPr>
+          <p:cNvPr id="16" name="Content Placeholder 4"/>
+          <p:cNvSpPr txBox="1">
+            <a:spLocks/>
+          </p:cNvSpPr>
+          <p:nvPr/>
+        </p:nvSpPr>
+        <p:spPr>
+          <a:xfrm>
+            <a:off x="7195873" y="3268767"/>
+            <a:ext cx="1402054" cy="583753"/>
+          </a:xfrm>
+          <a:prstGeom prst="rect">
+            <a:avLst/>
+          </a:prstGeom>
+        </p:spPr>
+        <p:txBody>
+          <a:bodyPr vert="horz" lIns="91440" tIns="45720" rIns="91440" bIns="45720" rtlCol="0">
             <a:normAutofit/>
           </a:bodyPr>
           <a:lstStyle>
-            <a:lvl1pPr algn="l" defTabSz="914400" rtl="0" eaLnBrk="1" latinLnBrk="0" hangingPunct="1">
+            <a:lvl1pPr marL="228600" indent="-228600" algn="l" defTabSz="914400" rtl="0" eaLnBrk="1" latinLnBrk="0" hangingPunct="1">
               <a:lnSpc>
                 <a:spcPct val="90000"/>
               </a:lnSpc>
               <a:spcBef>
-                <a:spcPct val="0"/>
+                <a:spcPts val="1000"/>
               </a:spcBef>
-              <a:buNone/>
-              <a:defRPr sz="4400" kern="1200">
+              <a:buFont typeface="Arial"/>
+              <a:buChar char="•"/>
+              <a:defRPr sz="2800" kern="1200">
                 <a:solidFill>
                   <a:schemeClr val="tx1"/>
                 </a:solidFill>
-                <a:latin typeface="+mj-lt"/>
-                <a:ea typeface="+mj-ea"/>
-                <a:cs typeface="+mj-cs"/>
+                <a:latin typeface="+mn-lt"/>
+                <a:ea typeface="+mn-ea"/>
+                <a:cs typeface="+mn-cs"/>
               </a:defRPr>
             </a:lvl1pPr>
+            <a:lvl2pPr marL="685800" indent="-228600" algn="l" defTabSz="914400" rtl="0" eaLnBrk="1" latinLnBrk="0" hangingPunct="1">
+              <a:lnSpc>
+                <a:spcPct val="90000"/>
+              </a:lnSpc>
+              <a:spcBef>
+                <a:spcPts val="500"/>
+              </a:spcBef>
+              <a:buFont typeface="Arial"/>
+              <a:buChar char="•"/>
+              <a:defRPr sz="2400" kern="1200">
+                <a:solidFill>
+                  <a:schemeClr val="tx1"/>
+                </a:solidFill>
+                <a:latin typeface="+mn-lt"/>
+                <a:ea typeface="+mn-ea"/>
+                <a:cs typeface="+mn-cs"/>
+              </a:defRPr>
+            </a:lvl2pPr>
+            <a:lvl3pPr marL="1143000" indent="-228600" algn="l" defTabSz="914400" rtl="0" eaLnBrk="1" latinLnBrk="0" hangingPunct="1">
+              <a:lnSpc>
+                <a:spcPct val="90000"/>
+              </a:lnSpc>
+              <a:spcBef>
+                <a:spcPts val="500"/>
+              </a:spcBef>
+              <a:buFont typeface="Arial"/>
+              <a:buChar char="•"/>
+              <a:defRPr sz="2000" kern="1200">
+                <a:solidFill>
+                  <a:schemeClr val="tx1"/>
+                </a:solidFill>
+                <a:latin typeface="+mn-lt"/>
+                <a:ea typeface="+mn-ea"/>
+                <a:cs typeface="+mn-cs"/>
+              </a:defRPr>
+            </a:lvl3pPr>
+            <a:lvl4pPr marL="1600200" indent="-228600" algn="l" defTabSz="914400" rtl="0" eaLnBrk="1" latinLnBrk="0" hangingPunct="1">
+              <a:lnSpc>
+                <a:spcPct val="90000"/>
+              </a:lnSpc>
+              <a:spcBef>
+                <a:spcPts val="500"/>
+              </a:spcBef>
+              <a:buFont typeface="Arial"/>
+              <a:buChar char="•"/>
+              <a:defRPr sz="1800" kern="1200">
+                <a:solidFill>
+                  <a:schemeClr val="tx1"/>
+                </a:solidFill>
+                <a:latin typeface="+mn-lt"/>
+                <a:ea typeface="+mn-ea"/>
+                <a:cs typeface="+mn-cs"/>
+              </a:defRPr>
+            </a:lvl4pPr>
+            <a:lvl5pPr marL="2057400" indent="-228600" algn="l" defTabSz="914400" rtl="0" eaLnBrk="1" latinLnBrk="0" hangingPunct="1">
+              <a:lnSpc>
+                <a:spcPct val="90000"/>
+              </a:lnSpc>
+              <a:spcBef>
+                <a:spcPts val="500"/>
+              </a:spcBef>
+              <a:buFont typeface="Arial"/>
+              <a:buChar char="•"/>
+              <a:defRPr sz="1800" kern="1200">
+                <a:solidFill>
+                  <a:schemeClr val="tx1"/>
+                </a:solidFill>
+                <a:latin typeface="+mn-lt"/>
+                <a:ea typeface="+mn-ea"/>
+                <a:cs typeface="+mn-cs"/>
+              </a:defRPr>
+            </a:lvl5pPr>
+            <a:lvl6pPr marL="2514600" indent="-228600" algn="l" defTabSz="914400" rtl="0" eaLnBrk="1" latinLnBrk="0" hangingPunct="1">
+              <a:lnSpc>
+                <a:spcPct val="90000"/>
+              </a:lnSpc>
+              <a:spcBef>
+                <a:spcPts val="500"/>
+              </a:spcBef>
+              <a:buFont typeface="Arial"/>
+              <a:buChar char="•"/>
+              <a:defRPr sz="1800" kern="1200">
+                <a:solidFill>
+                  <a:schemeClr val="tx1"/>
+                </a:solidFill>
+                <a:latin typeface="+mn-lt"/>
+                <a:ea typeface="+mn-ea"/>
+                <a:cs typeface="+mn-cs"/>
+              </a:defRPr>
+            </a:lvl6pPr>
+            <a:lvl7pPr marL="2971800" indent="-228600" algn="l" defTabSz="914400" rtl="0" eaLnBrk="1" latinLnBrk="0" hangingPunct="1">
+              <a:lnSpc>
+                <a:spcPct val="90000"/>
+              </a:lnSpc>
+              <a:spcBef>
+                <a:spcPts val="500"/>
+              </a:spcBef>
+              <a:buFont typeface="Arial"/>
+              <a:buChar char="•"/>
+              <a:defRPr sz="1800" kern="1200">
+                <a:solidFill>
+                  <a:schemeClr val="tx1"/>
+                </a:solidFill>
+                <a:latin typeface="+mn-lt"/>
+                <a:ea typeface="+mn-ea"/>
+                <a:cs typeface="+mn-cs"/>
+              </a:defRPr>
+            </a:lvl7pPr>
+            <a:lvl8pPr marL="3429000" indent="-228600" algn="l" defTabSz="914400" rtl="0" eaLnBrk="1" latinLnBrk="0" hangingPunct="1">
+              <a:lnSpc>
+                <a:spcPct val="90000"/>
+              </a:lnSpc>
+              <a:spcBef>
+                <a:spcPts val="500"/>
+              </a:spcBef>
+              <a:buFont typeface="Arial"/>
+              <a:buChar char="•"/>
+              <a:defRPr sz="1800" kern="1200">
+                <a:solidFill>
+                  <a:schemeClr val="tx1"/>
+                </a:solidFill>
+                <a:latin typeface="+mn-lt"/>
+                <a:ea typeface="+mn-ea"/>
+                <a:cs typeface="+mn-cs"/>
+              </a:defRPr>
+            </a:lvl8pPr>
+            <a:lvl9pPr marL="3886200" indent="-228600" algn="l" defTabSz="914400" rtl="0" eaLnBrk="1" latinLnBrk="0" hangingPunct="1">
+              <a:lnSpc>
+                <a:spcPct val="90000"/>
+              </a:lnSpc>
+              <a:spcBef>
+                <a:spcPts val="500"/>
+              </a:spcBef>
+              <a:buFont typeface="Arial"/>
+              <a:buChar char="•"/>
+              <a:defRPr sz="1800" kern="1200">
+                <a:solidFill>
+                  <a:schemeClr val="tx1"/>
+                </a:solidFill>
+                <a:latin typeface="+mn-lt"/>
+                <a:ea typeface="+mn-ea"/>
+                <a:cs typeface="+mn-cs"/>
+              </a:defRPr>
+            </a:lvl9pPr>
           </a:lstStyle>
           <a:p>
-            <a:r>
-              <a:rPr lang="en-US" sz="5400" dirty="0" smtClean="0"/>
-              <a:t>Beta=(-1,5)</a:t>
-            </a:r>
-            <a:endParaRPr lang="en-US" sz="5400" dirty="0"/>
+            <a:pPr marL="0" indent="0">
+              <a:lnSpc>
+                <a:spcPct val="100000"/>
+              </a:lnSpc>
+              <a:spcBef>
+                <a:spcPts val="0"/>
+              </a:spcBef>
+              <a:buFontTx/>
+              <a:buNone/>
+            </a:pPr>
+            <a:r>
+              <a:rPr lang="en-US" dirty="0" smtClean="0"/>
+              <a:t>Action 2</a:t>
+            </a:r>
+            <a:endParaRPr lang="en-US" dirty="0"/>
+          </a:p>
+        </p:txBody>
+      </p:sp>
+      <p:sp>
+        <p:nvSpPr>
+          <p:cNvPr id="20" name="Content Placeholder 4"/>
+          <p:cNvSpPr txBox="1">
+            <a:spLocks/>
+          </p:cNvSpPr>
+          <p:nvPr/>
+        </p:nvSpPr>
+        <p:spPr>
+          <a:xfrm>
+            <a:off x="9476753" y="6217521"/>
+            <a:ext cx="1402054" cy="583753"/>
+          </a:xfrm>
+          <a:prstGeom prst="rect">
+            <a:avLst/>
+          </a:prstGeom>
+        </p:spPr>
+        <p:txBody>
+          <a:bodyPr vert="horz" lIns="91440" tIns="45720" rIns="91440" bIns="45720" rtlCol="0">
+            <a:normAutofit/>
+          </a:bodyPr>
+          <a:lstStyle>
+            <a:lvl1pPr marL="228600" indent="-228600" algn="l" defTabSz="914400" rtl="0" eaLnBrk="1" latinLnBrk="0" hangingPunct="1">
+              <a:lnSpc>
+                <a:spcPct val="90000"/>
+              </a:lnSpc>
+              <a:spcBef>
+                <a:spcPts val="1000"/>
+              </a:spcBef>
+              <a:buFont typeface="Arial"/>
+              <a:buChar char="•"/>
+              <a:defRPr sz="2800" kern="1200">
+                <a:solidFill>
+                  <a:schemeClr val="tx1"/>
+                </a:solidFill>
+                <a:latin typeface="+mn-lt"/>
+                <a:ea typeface="+mn-ea"/>
+                <a:cs typeface="+mn-cs"/>
+              </a:defRPr>
+            </a:lvl1pPr>
+            <a:lvl2pPr marL="685800" indent="-228600" algn="l" defTabSz="914400" rtl="0" eaLnBrk="1" latinLnBrk="0" hangingPunct="1">
+              <a:lnSpc>
+                <a:spcPct val="90000"/>
+              </a:lnSpc>
+              <a:spcBef>
+                <a:spcPts val="500"/>
+              </a:spcBef>
+              <a:buFont typeface="Arial"/>
+              <a:buChar char="•"/>
+              <a:defRPr sz="2400" kern="1200">
+                <a:solidFill>
+                  <a:schemeClr val="tx1"/>
+                </a:solidFill>
+                <a:latin typeface="+mn-lt"/>
+                <a:ea typeface="+mn-ea"/>
+                <a:cs typeface="+mn-cs"/>
+              </a:defRPr>
+            </a:lvl2pPr>
+            <a:lvl3pPr marL="1143000" indent="-228600" algn="l" defTabSz="914400" rtl="0" eaLnBrk="1" latinLnBrk="0" hangingPunct="1">
+              <a:lnSpc>
+                <a:spcPct val="90000"/>
+              </a:lnSpc>
+              <a:spcBef>
+                <a:spcPts val="500"/>
+              </a:spcBef>
+              <a:buFont typeface="Arial"/>
+              <a:buChar char="•"/>
+              <a:defRPr sz="2000" kern="1200">
+                <a:solidFill>
+                  <a:schemeClr val="tx1"/>
+                </a:solidFill>
+                <a:latin typeface="+mn-lt"/>
+                <a:ea typeface="+mn-ea"/>
+                <a:cs typeface="+mn-cs"/>
+              </a:defRPr>
+            </a:lvl3pPr>
+            <a:lvl4pPr marL="1600200" indent="-228600" algn="l" defTabSz="914400" rtl="0" eaLnBrk="1" latinLnBrk="0" hangingPunct="1">
+              <a:lnSpc>
+                <a:spcPct val="90000"/>
+              </a:lnSpc>
+              <a:spcBef>
+                <a:spcPts val="500"/>
+              </a:spcBef>
+              <a:buFont typeface="Arial"/>
+              <a:buChar char="•"/>
+              <a:defRPr sz="1800" kern="1200">
+                <a:solidFill>
+                  <a:schemeClr val="tx1"/>
+                </a:solidFill>
+                <a:latin typeface="+mn-lt"/>
+                <a:ea typeface="+mn-ea"/>
+                <a:cs typeface="+mn-cs"/>
+              </a:defRPr>
+            </a:lvl4pPr>
+            <a:lvl5pPr marL="2057400" indent="-228600" algn="l" defTabSz="914400" rtl="0" eaLnBrk="1" latinLnBrk="0" hangingPunct="1">
+              <a:lnSpc>
+                <a:spcPct val="90000"/>
+              </a:lnSpc>
+              <a:spcBef>
+                <a:spcPts val="500"/>
+              </a:spcBef>
+              <a:buFont typeface="Arial"/>
+              <a:buChar char="•"/>
+              <a:defRPr sz="1800" kern="1200">
+                <a:solidFill>
+                  <a:schemeClr val="tx1"/>
+                </a:solidFill>
+                <a:latin typeface="+mn-lt"/>
+                <a:ea typeface="+mn-ea"/>
+                <a:cs typeface="+mn-cs"/>
+              </a:defRPr>
+            </a:lvl5pPr>
+            <a:lvl6pPr marL="2514600" indent="-228600" algn="l" defTabSz="914400" rtl="0" eaLnBrk="1" latinLnBrk="0" hangingPunct="1">
+              <a:lnSpc>
+                <a:spcPct val="90000"/>
+              </a:lnSpc>
+              <a:spcBef>
+                <a:spcPts val="500"/>
+              </a:spcBef>
+              <a:buFont typeface="Arial"/>
+              <a:buChar char="•"/>
+              <a:defRPr sz="1800" kern="1200">
+                <a:solidFill>
+                  <a:schemeClr val="tx1"/>
+                </a:solidFill>
+                <a:latin typeface="+mn-lt"/>
+                <a:ea typeface="+mn-ea"/>
+                <a:cs typeface="+mn-cs"/>
+              </a:defRPr>
+            </a:lvl6pPr>
+            <a:lvl7pPr marL="2971800" indent="-228600" algn="l" defTabSz="914400" rtl="0" eaLnBrk="1" latinLnBrk="0" hangingPunct="1">
+              <a:lnSpc>
+                <a:spcPct val="90000"/>
+              </a:lnSpc>
+              <a:spcBef>
+                <a:spcPts val="500"/>
+              </a:spcBef>
+              <a:buFont typeface="Arial"/>
+              <a:buChar char="•"/>
+              <a:defRPr sz="1800" kern="1200">
+                <a:solidFill>
+                  <a:schemeClr val="tx1"/>
+                </a:solidFill>
+                <a:latin typeface="+mn-lt"/>
+                <a:ea typeface="+mn-ea"/>
+                <a:cs typeface="+mn-cs"/>
+              </a:defRPr>
+            </a:lvl7pPr>
+            <a:lvl8pPr marL="3429000" indent="-228600" algn="l" defTabSz="914400" rtl="0" eaLnBrk="1" latinLnBrk="0" hangingPunct="1">
+              <a:lnSpc>
+                <a:spcPct val="90000"/>
+              </a:lnSpc>
+              <a:spcBef>
+                <a:spcPts val="500"/>
+              </a:spcBef>
+              <a:buFont typeface="Arial"/>
+              <a:buChar char="•"/>
+              <a:defRPr sz="1800" kern="1200">
+                <a:solidFill>
+                  <a:schemeClr val="tx1"/>
+                </a:solidFill>
+                <a:latin typeface="+mn-lt"/>
+                <a:ea typeface="+mn-ea"/>
+                <a:cs typeface="+mn-cs"/>
+              </a:defRPr>
+            </a:lvl8pPr>
+            <a:lvl9pPr marL="3886200" indent="-228600" algn="l" defTabSz="914400" rtl="0" eaLnBrk="1" latinLnBrk="0" hangingPunct="1">
+              <a:lnSpc>
+                <a:spcPct val="90000"/>
+              </a:lnSpc>
+              <a:spcBef>
+                <a:spcPts val="500"/>
+              </a:spcBef>
+              <a:buFont typeface="Arial"/>
+              <a:buChar char="•"/>
+              <a:defRPr sz="1800" kern="1200">
+                <a:solidFill>
+                  <a:schemeClr val="tx1"/>
+                </a:solidFill>
+                <a:latin typeface="+mn-lt"/>
+                <a:ea typeface="+mn-ea"/>
+                <a:cs typeface="+mn-cs"/>
+              </a:defRPr>
+            </a:lvl9pPr>
+          </a:lstStyle>
+          <a:p>
+            <a:pPr marL="0" indent="0">
+              <a:lnSpc>
+                <a:spcPct val="100000"/>
+              </a:lnSpc>
+              <a:spcBef>
+                <a:spcPts val="0"/>
+              </a:spcBef>
+              <a:buFontTx/>
+              <a:buNone/>
+            </a:pPr>
+            <a:r>
+              <a:rPr lang="en-US" dirty="0" smtClean="0"/>
+              <a:t>Cutoff</a:t>
+            </a:r>
+            <a:endParaRPr lang="en-US" dirty="0"/>
           </a:p>
         </p:txBody>
       </p:sp>
     </p:spTree>
     <p:extLst>
       <p:ext uri="{BB962C8B-B14F-4D97-AF65-F5344CB8AC3E}">
-        <p14:creationId xmlns:p14="http://schemas.microsoft.com/office/powerpoint/2010/main" val="1672609143"/>
+        <p14:creationId xmlns:p14="http://schemas.microsoft.com/office/powerpoint/2010/main" val="218542839"/>
       </p:ext>
     </p:extLst>
   </p:cSld>
   <p:clrMapOvr>
     <a:masterClrMapping/>
   </p:clrMapOvr>
+  <p:timing>
+    <p:tnLst>
+      <p:par>
+        <p:cTn id="1" dur="indefinite" restart="never" nodeType="tmRoot"/>
+      </p:par>
+    </p:tnLst>
+  </p:timing>
 </p:sld>
 </file>
 
@@ -3725,9 +4336,58 @@
           </a:p>
         </p:txBody>
       </p:sp>
+      <p:sp>
+        <p:nvSpPr>
+          <p:cNvPr id="5" name="Title 1"/>
+          <p:cNvSpPr txBox="1">
+            <a:spLocks/>
+          </p:cNvSpPr>
+          <p:nvPr/>
+        </p:nvSpPr>
+        <p:spPr>
+          <a:xfrm>
+            <a:off x="8661400" y="1531938"/>
+            <a:ext cx="7061200" cy="2047875"/>
+          </a:xfrm>
+          <a:prstGeom prst="rect">
+            <a:avLst/>
+          </a:prstGeom>
+        </p:spPr>
+        <p:txBody>
+          <a:bodyPr vert="horz" lIns="91440" tIns="45720" rIns="91440" bIns="45720" rtlCol="0" anchor="ctr">
+            <a:normAutofit/>
+          </a:bodyPr>
+          <a:lstStyle>
+            <a:lvl1pPr algn="l" defTabSz="914400" rtl="0" eaLnBrk="1" latinLnBrk="0" hangingPunct="1">
+              <a:lnSpc>
+                <a:spcPct val="90000"/>
+              </a:lnSpc>
+              <a:spcBef>
+                <a:spcPct val="0"/>
+              </a:spcBef>
+              <a:buNone/>
+              <a:defRPr sz="4400" kern="1200">
+                <a:solidFill>
+                  <a:schemeClr val="tx1"/>
+                </a:solidFill>
+                <a:latin typeface="+mj-lt"/>
+                <a:ea typeface="+mj-ea"/>
+                <a:cs typeface="+mj-cs"/>
+              </a:defRPr>
+            </a:lvl1pPr>
+          </a:lstStyle>
+          <a:p>
+            <a:r>
+              <a:rPr lang="en-US" sz="5400" dirty="0" smtClean="0"/>
+              <a:t>Beta=(-1,5)</a:t>
+            </a:r>
+            <a:endParaRPr lang="en-US" sz="5400" dirty="0"/>
+          </a:p>
+        </p:txBody>
+      </p:sp>
       <p:pic>
         <p:nvPicPr>
-          <p:cNvPr id="4" name="Content Placeholder 3"/>
+          <p:cNvPr id="10" name="Content Placeholder 9"/>
           <p:cNvPicPr>
             <a:picLocks noGrp="1" noChangeAspect="1"/>
           </p:cNvPicPr>
@@ -3750,10 +4410,66 @@
         <p:spPr>
           <a:xfrm>
             <a:off x="0" y="0"/>
-            <a:ext cx="10195034" cy="6858000"/>
+            <a:ext cx="8625814" cy="6858000"/>
           </a:xfrm>
         </p:spPr>
       </p:pic>
+    </p:spTree>
+    <p:extLst>
+      <p:ext uri="{BB962C8B-B14F-4D97-AF65-F5344CB8AC3E}">
+        <p14:creationId xmlns:p14="http://schemas.microsoft.com/office/powerpoint/2010/main" val="1672609143"/>
+      </p:ext>
+    </p:extLst>
+  </p:cSld>
+  <p:clrMapOvr>
+    <a:masterClrMapping/>
+  </p:clrMapOvr>
+  <p:timing>
+    <p:tnLst>
+      <p:par>
+        <p:cTn id="1" dur="indefinite" restart="never" nodeType="tmRoot"/>
+      </p:par>
+    </p:tnLst>
+  </p:timing>
+</p:sld>
+</file>
+
+<file path=ppt/slides/slide8.xml><?xml version="1.0" encoding="utf-8"?>
+<p:sld xmlns:a="http://schemas.openxmlformats.org/drawingml/2006/main" xmlns:r="http://schemas.openxmlformats.org/officeDocument/2006/relationships" xmlns:p="http://schemas.openxmlformats.org/presentationml/2006/main">
+  <p:cSld>
+    <p:spTree>
+      <p:nvGrpSpPr>
+        <p:cNvPr id="1" name=""/>
+        <p:cNvGrpSpPr/>
+        <p:nvPr/>
+      </p:nvGrpSpPr>
+      <p:grpSpPr>
+        <a:xfrm>
+          <a:off x="0" y="0"/>
+          <a:ext cx="0" cy="0"/>
+          <a:chOff x="0" y="0"/>
+          <a:chExt cx="0" cy="0"/>
+        </a:xfrm>
+      </p:grpSpPr>
+      <p:sp>
+        <p:nvSpPr>
+          <p:cNvPr id="2" name="Title 1"/>
+          <p:cNvSpPr>
+            <a:spLocks noGrp="1"/>
+          </p:cNvSpPr>
+          <p:nvPr>
+            <p:ph type="title"/>
+          </p:nvPr>
+        </p:nvSpPr>
+        <p:spPr/>
+        <p:txBody>
+          <a:bodyPr/>
+          <a:lstStyle/>
+          <a:p>
+            <a:endParaRPr lang="en-US"/>
+          </a:p>
+        </p:txBody>
+      </p:sp>
       <p:sp>
         <p:nvSpPr>
           <p:cNvPr id="5" name="Title 1"/>
@@ -3764,7 +4480,7 @@
         </p:nvSpPr>
         <p:spPr>
           <a:xfrm>
-            <a:off x="6426200" y="998538"/>
+            <a:off x="8834120" y="2055813"/>
             <a:ext cx="7061200" cy="2047875"/>
           </a:xfrm>
           <a:prstGeom prst="rect">
@@ -3803,6 +4519,35 @@
           </a:p>
         </p:txBody>
       </p:sp>
+      <p:pic>
+        <p:nvPicPr>
+          <p:cNvPr id="6" name="Content Placeholder 5"/>
+          <p:cNvPicPr>
+            <a:picLocks noGrp="1" noChangeAspect="1"/>
+          </p:cNvPicPr>
+          <p:nvPr>
+            <p:ph idx="1"/>
+          </p:nvPr>
+        </p:nvPicPr>
+        <p:blipFill>
+          <a:blip r:embed="rId2">
+            <a:extLst>
+              <a:ext uri="{28A0092B-C50C-407E-A947-70E740481C1C}">
+                <a14:useLocalDpi xmlns:a14="http://schemas.microsoft.com/office/drawing/2010/main" val="0"/>
+              </a:ext>
+            </a:extLst>
+          </a:blip>
+          <a:stretch>
+            <a:fillRect/>
+          </a:stretch>
+        </p:blipFill>
+        <p:spPr>
+          <a:xfrm>
+            <a:off x="0" y="0"/>
+            <a:ext cx="8625814" cy="6858000"/>
+          </a:xfrm>
+        </p:spPr>
+      </p:pic>
     </p:spTree>
     <p:extLst>
       <p:ext uri="{BB962C8B-B14F-4D97-AF65-F5344CB8AC3E}">

</xml_diff>